<commit_message>
added username:moose password:moose in instructions for liveCD/usb to GUI guide
git-svn-id: https://svn.code.sf.net/p/moose/code/moose/branches/buildQ@3896 d1858a74-f715-0410-99c9-c66fe9cce3d6
</commit_message>
<xml_diff>
--- a/Docs/MOOSE_GUI_guide.pptx
+++ b/Docs/MOOSE_GUI_guide.pptx
@@ -194,7 +194,7 @@
           <a:p>
             <a:fld id="{422CB174-FA01-4171-A869-52C1D9424384}" type="datetimeFigureOut">
               <a:rPr lang="en-US" smtClean="0"/>
-              <a:t>8/24/2012</a:t>
+              <a:t>8/25/2012</a:t>
             </a:fld>
             <a:endParaRPr lang="en-US"/>
           </a:p>
@@ -643,7 +643,7 @@
           <a:p>
             <a:fld id="{6E135D10-B346-49A2-97ED-CB96BA7E5DA0}" type="datetimeFigureOut">
               <a:rPr lang="en-US" smtClean="0"/>
-              <a:t>8/24/2012</a:t>
+              <a:t>8/25/2012</a:t>
             </a:fld>
             <a:endParaRPr lang="en-US"/>
           </a:p>
@@ -813,7 +813,7 @@
           <a:p>
             <a:fld id="{6E135D10-B346-49A2-97ED-CB96BA7E5DA0}" type="datetimeFigureOut">
               <a:rPr lang="en-US" smtClean="0"/>
-              <a:t>8/24/2012</a:t>
+              <a:t>8/25/2012</a:t>
             </a:fld>
             <a:endParaRPr lang="en-US"/>
           </a:p>
@@ -993,7 +993,7 @@
           <a:p>
             <a:fld id="{6E135D10-B346-49A2-97ED-CB96BA7E5DA0}" type="datetimeFigureOut">
               <a:rPr lang="en-US" smtClean="0"/>
-              <a:t>8/24/2012</a:t>
+              <a:t>8/25/2012</a:t>
             </a:fld>
             <a:endParaRPr lang="en-US"/>
           </a:p>
@@ -1163,7 +1163,7 @@
           <a:p>
             <a:fld id="{6E135D10-B346-49A2-97ED-CB96BA7E5DA0}" type="datetimeFigureOut">
               <a:rPr lang="en-US" smtClean="0"/>
-              <a:t>8/24/2012</a:t>
+              <a:t>8/25/2012</a:t>
             </a:fld>
             <a:endParaRPr lang="en-US"/>
           </a:p>
@@ -1409,7 +1409,7 @@
           <a:p>
             <a:fld id="{6E135D10-B346-49A2-97ED-CB96BA7E5DA0}" type="datetimeFigureOut">
               <a:rPr lang="en-US" smtClean="0"/>
-              <a:t>8/24/2012</a:t>
+              <a:t>8/25/2012</a:t>
             </a:fld>
             <a:endParaRPr lang="en-US"/>
           </a:p>
@@ -1697,7 +1697,7 @@
           <a:p>
             <a:fld id="{6E135D10-B346-49A2-97ED-CB96BA7E5DA0}" type="datetimeFigureOut">
               <a:rPr lang="en-US" smtClean="0"/>
-              <a:t>8/24/2012</a:t>
+              <a:t>8/25/2012</a:t>
             </a:fld>
             <a:endParaRPr lang="en-US"/>
           </a:p>
@@ -2119,7 +2119,7 @@
           <a:p>
             <a:fld id="{6E135D10-B346-49A2-97ED-CB96BA7E5DA0}" type="datetimeFigureOut">
               <a:rPr lang="en-US" smtClean="0"/>
-              <a:t>8/24/2012</a:t>
+              <a:t>8/25/2012</a:t>
             </a:fld>
             <a:endParaRPr lang="en-US"/>
           </a:p>
@@ -2237,7 +2237,7 @@
           <a:p>
             <a:fld id="{6E135D10-B346-49A2-97ED-CB96BA7E5DA0}" type="datetimeFigureOut">
               <a:rPr lang="en-US" smtClean="0"/>
-              <a:t>8/24/2012</a:t>
+              <a:t>8/25/2012</a:t>
             </a:fld>
             <a:endParaRPr lang="en-US"/>
           </a:p>
@@ -2332,7 +2332,7 @@
           <a:p>
             <a:fld id="{6E135D10-B346-49A2-97ED-CB96BA7E5DA0}" type="datetimeFigureOut">
               <a:rPr lang="en-US" smtClean="0"/>
-              <a:t>8/24/2012</a:t>
+              <a:t>8/25/2012</a:t>
             </a:fld>
             <a:endParaRPr lang="en-US"/>
           </a:p>
@@ -2609,7 +2609,7 @@
           <a:p>
             <a:fld id="{6E135D10-B346-49A2-97ED-CB96BA7E5DA0}" type="datetimeFigureOut">
               <a:rPr lang="en-US" smtClean="0"/>
-              <a:t>8/24/2012</a:t>
+              <a:t>8/25/2012</a:t>
             </a:fld>
             <a:endParaRPr lang="en-US"/>
           </a:p>
@@ -2862,7 +2862,7 @@
           <a:p>
             <a:fld id="{6E135D10-B346-49A2-97ED-CB96BA7E5DA0}" type="datetimeFigureOut">
               <a:rPr lang="en-US" smtClean="0"/>
-              <a:t>8/24/2012</a:t>
+              <a:t>8/25/2012</a:t>
             </a:fld>
             <a:endParaRPr lang="en-US"/>
           </a:p>
@@ -3075,7 +3075,7 @@
           <a:p>
             <a:fld id="{6E135D10-B346-49A2-97ED-CB96BA7E5DA0}" type="datetimeFigureOut">
               <a:rPr lang="en-US" smtClean="0"/>
-              <a:t>8/24/2012</a:t>
+              <a:t>8/25/2012</a:t>
             </a:fld>
             <a:endParaRPr lang="en-US"/>
           </a:p>
@@ -3513,17 +3513,46 @@
             </a:r>
             <a:r>
               <a:rPr lang="en-US" sz="1600" dirty="0" smtClean="0"/>
-              <a:t>) on Ubuntu 12.04. Boot off it, on your machine, or in a virtual machine (virtualbox.org).</a:t>
-            </a:r>
+              <a:t>) on Ubuntu 12.04. Boot off it, on your machine, or </a:t>
+            </a:r>
+            <a:r>
+              <a:rPr lang="en-US" sz="1600" dirty="0" smtClean="0"/>
+              <a:t>using</a:t>
+            </a:r>
+            <a:r>
+              <a:rPr lang="en-US" sz="1600" dirty="0" smtClean="0"/>
+              <a:t> </a:t>
+            </a:r>
+            <a:r>
+              <a:rPr lang="en-US" sz="1600" dirty="0" smtClean="0"/>
+              <a:t>virtualbox.org. </a:t>
+            </a:r>
+            <a:r>
+              <a:rPr lang="en-US" sz="1600" dirty="0" err="1"/>
+              <a:t>U</a:t>
+            </a:r>
+            <a:r>
+              <a:rPr lang="en-US" sz="1600" smtClean="0"/>
+              <a:t>ser:moose</a:t>
+            </a:r>
+            <a:r>
+              <a:rPr lang="en-US" sz="1600" dirty="0" smtClean="0"/>
+              <a:t>, </a:t>
+            </a:r>
+            <a:r>
+              <a:rPr lang="en-US" sz="1600" dirty="0" err="1" smtClean="0"/>
+              <a:t>passwd:moose</a:t>
+            </a:r>
+            <a:r>
+              <a:rPr lang="en-US" sz="1600" dirty="0" smtClean="0"/>
+              <a:t>.</a:t>
+            </a:r>
+            <a:endParaRPr lang="en-US" sz="1600" dirty="0" smtClean="0"/>
           </a:p>
           <a:p>
             <a:r>
               <a:rPr lang="en-US" sz="2000" dirty="0" smtClean="0"/>
-              <a:t>Quick start</a:t>
-            </a:r>
-            <a:r>
-              <a:rPr lang="en-US" sz="2000" dirty="0" smtClean="0"/>
-              <a:t> MOOSE:</a:t>
+              <a:t>Quick start MOOSE:</a:t>
             </a:r>
           </a:p>
           <a:p>
@@ -3612,11 +3641,7 @@
             <a:pPr lvl="1"/>
             <a:r>
               <a:rPr lang="en-US" sz="1600" dirty="0" smtClean="0"/>
-              <a:t>You can</a:t>
-            </a:r>
-            <a:r>
-              <a:rPr lang="en-US" sz="1600" dirty="0" smtClean="0"/>
-              <a:t> ‘stop’ a simulation in-between and ‘run’ again for another ‘Run Time’. ‘Reset’ and ‘run’ to start from t=0.</a:t>
+              <a:t>You can ‘stop’ a simulation in-between and ‘run’ again for another ‘Run Time’. ‘Reset’ and ‘run’ to start from t=0.</a:t>
             </a:r>
           </a:p>
           <a:p>
@@ -3664,7 +3689,6 @@
               <a:rPr lang="en-US" sz="1600" dirty="0" smtClean="0"/>
               <a:t>’ at which the GUI plots are refreshed. Units: seconds.</a:t>
             </a:r>
-            <a:endParaRPr lang="en-US" sz="1600" dirty="0" smtClean="0"/>
           </a:p>
           <a:p>
             <a:pPr lvl="1"/>
@@ -3864,11 +3888,7 @@
           <a:p>
             <a:r>
               <a:rPr lang="en-US" sz="2000" dirty="0" smtClean="0"/>
-              <a:t>Changing Parameters</a:t>
-            </a:r>
-            <a:r>
-              <a:rPr lang="en-US" sz="2000" dirty="0" smtClean="0"/>
-              <a:t>:</a:t>
+              <a:t>Changing Parameters:</a:t>
             </a:r>
           </a:p>
           <a:p>
@@ -3877,7 +3897,6 @@
               <a:rPr lang="en-US" sz="1600" dirty="0" smtClean="0"/>
               <a:t>All units are in SI.</a:t>
             </a:r>
-            <a:endParaRPr lang="en-US" sz="1600" dirty="0" smtClean="0"/>
           </a:p>
           <a:p>
             <a:pPr lvl="1"/>
@@ -3907,7 +3926,6 @@
               <a:rPr lang="en-US" sz="1600" dirty="0" smtClean="0"/>
               <a:t>Reversible reactions  are empty ellipses, with the reaction direction in green.</a:t>
             </a:r>
-            <a:endParaRPr lang="en-US" sz="1600" dirty="0" smtClean="0"/>
           </a:p>
           <a:p>
             <a:pPr lvl="1"/>
@@ -3928,11 +3946,7 @@
             <a:pPr lvl="1"/>
             <a:r>
               <a:rPr lang="en-US" sz="1600" dirty="0" smtClean="0"/>
-              <a:t>An empty unlinked box near a filled ellipse signifies an </a:t>
-            </a:r>
-            <a:r>
-              <a:rPr lang="en-US" sz="1600" dirty="0" smtClean="0"/>
-              <a:t>explicit enzyme complex for an explicit enzyme reaction.</a:t>
+              <a:t>An empty unlinked box near a filled ellipse signifies an explicit enzyme complex for an explicit enzyme reaction.</a:t>
             </a:r>
           </a:p>
           <a:p>
@@ -3969,7 +3983,6 @@
               <a:rPr lang="en-US" sz="1600" dirty="0" smtClean="0"/>
               <a:t>Rubber-band select (click-and-drag) a rectangular region having a pool, which pops up a context menu to (1) zoom to selected region; or (2) move / click-and-drag the objects in the selected region.</a:t>
             </a:r>
-            <a:endParaRPr lang="en-US" sz="1600" dirty="0" smtClean="0"/>
           </a:p>
         </p:txBody>
       </p:sp>
@@ -4162,11 +4175,7 @@
           <a:p>
             <a:r>
               <a:rPr lang="en-US" sz="2000" dirty="0" smtClean="0"/>
-              <a:t>Plotting</a:t>
-            </a:r>
-            <a:r>
-              <a:rPr lang="en-US" sz="2000" dirty="0" smtClean="0"/>
-              <a:t>:</a:t>
+              <a:t>Plotting:</a:t>
             </a:r>
           </a:p>
           <a:p>
@@ -4175,7 +4184,6 @@
               <a:rPr lang="en-US" sz="1600" dirty="0" smtClean="0"/>
               <a:t>In the ‘Plot Configuration’ panel, click ‘New plot tab’.</a:t>
             </a:r>
-            <a:endParaRPr lang="en-US" sz="1600" dirty="0" smtClean="0"/>
           </a:p>
           <a:p>
             <a:pPr lvl="1"/>
@@ -4216,7 +4224,6 @@
               <a:rPr lang="en-US" sz="1600" dirty="0" smtClean="0"/>
               <a:t>→‘View’ →‘Sub Windows’/‘Tabs’ to tile the plots differently.</a:t>
             </a:r>
-            <a:endParaRPr lang="en-US" sz="1600" dirty="0" smtClean="0"/>
           </a:p>
           <a:p>
             <a:pPr lvl="1"/>
@@ -4228,11 +4235,7 @@
           <a:p>
             <a:r>
               <a:rPr lang="en-US" sz="2000" dirty="0" smtClean="0"/>
-              <a:t>Switching Solvers</a:t>
-            </a:r>
-            <a:r>
-              <a:rPr lang="en-US" sz="2000" dirty="0" smtClean="0"/>
-              <a:t>:</a:t>
+              <a:t>Switching Solvers:</a:t>
             </a:r>
           </a:p>
           <a:p>
@@ -4279,11 +4282,7 @@
           <a:p>
             <a:r>
               <a:rPr lang="en-US" sz="2000" dirty="0" smtClean="0"/>
-              <a:t>Neuron / Electrical</a:t>
-            </a:r>
-            <a:r>
-              <a:rPr lang="en-US" sz="2000" dirty="0" smtClean="0"/>
-              <a:t>:</a:t>
+              <a:t>Neuron / Electrical:</a:t>
             </a:r>
           </a:p>
           <a:p>

</xml_diff>

<commit_message>
mild updates to the MOOSE_GUI_guide
git-svn-id: https://svn.code.sf.net/p/moose/code/moose/branches/buildQ@3900 d1858a74-f715-0410-99c9-c66fe9cce3d6
</commit_message>
<xml_diff>
--- a/Docs/MOOSE_GUI_guide.pptx
+++ b/Docs/MOOSE_GUI_guide.pptx
@@ -194,7 +194,7 @@
           <a:p>
             <a:fld id="{422CB174-FA01-4171-A869-52C1D9424384}" type="datetimeFigureOut">
               <a:rPr lang="en-US" smtClean="0"/>
-              <a:t>8/25/2012</a:t>
+              <a:t>8/26/2012</a:t>
             </a:fld>
             <a:endParaRPr lang="en-US"/>
           </a:p>
@@ -643,7 +643,7 @@
           <a:p>
             <a:fld id="{6E135D10-B346-49A2-97ED-CB96BA7E5DA0}" type="datetimeFigureOut">
               <a:rPr lang="en-US" smtClean="0"/>
-              <a:t>8/25/2012</a:t>
+              <a:t>8/26/2012</a:t>
             </a:fld>
             <a:endParaRPr lang="en-US"/>
           </a:p>
@@ -813,7 +813,7 @@
           <a:p>
             <a:fld id="{6E135D10-B346-49A2-97ED-CB96BA7E5DA0}" type="datetimeFigureOut">
               <a:rPr lang="en-US" smtClean="0"/>
-              <a:t>8/25/2012</a:t>
+              <a:t>8/26/2012</a:t>
             </a:fld>
             <a:endParaRPr lang="en-US"/>
           </a:p>
@@ -993,7 +993,7 @@
           <a:p>
             <a:fld id="{6E135D10-B346-49A2-97ED-CB96BA7E5DA0}" type="datetimeFigureOut">
               <a:rPr lang="en-US" smtClean="0"/>
-              <a:t>8/25/2012</a:t>
+              <a:t>8/26/2012</a:t>
             </a:fld>
             <a:endParaRPr lang="en-US"/>
           </a:p>
@@ -1163,7 +1163,7 @@
           <a:p>
             <a:fld id="{6E135D10-B346-49A2-97ED-CB96BA7E5DA0}" type="datetimeFigureOut">
               <a:rPr lang="en-US" smtClean="0"/>
-              <a:t>8/25/2012</a:t>
+              <a:t>8/26/2012</a:t>
             </a:fld>
             <a:endParaRPr lang="en-US"/>
           </a:p>
@@ -1409,7 +1409,7 @@
           <a:p>
             <a:fld id="{6E135D10-B346-49A2-97ED-CB96BA7E5DA0}" type="datetimeFigureOut">
               <a:rPr lang="en-US" smtClean="0"/>
-              <a:t>8/25/2012</a:t>
+              <a:t>8/26/2012</a:t>
             </a:fld>
             <a:endParaRPr lang="en-US"/>
           </a:p>
@@ -1697,7 +1697,7 @@
           <a:p>
             <a:fld id="{6E135D10-B346-49A2-97ED-CB96BA7E5DA0}" type="datetimeFigureOut">
               <a:rPr lang="en-US" smtClean="0"/>
-              <a:t>8/25/2012</a:t>
+              <a:t>8/26/2012</a:t>
             </a:fld>
             <a:endParaRPr lang="en-US"/>
           </a:p>
@@ -2119,7 +2119,7 @@
           <a:p>
             <a:fld id="{6E135D10-B346-49A2-97ED-CB96BA7E5DA0}" type="datetimeFigureOut">
               <a:rPr lang="en-US" smtClean="0"/>
-              <a:t>8/25/2012</a:t>
+              <a:t>8/26/2012</a:t>
             </a:fld>
             <a:endParaRPr lang="en-US"/>
           </a:p>
@@ -2237,7 +2237,7 @@
           <a:p>
             <a:fld id="{6E135D10-B346-49A2-97ED-CB96BA7E5DA0}" type="datetimeFigureOut">
               <a:rPr lang="en-US" smtClean="0"/>
-              <a:t>8/25/2012</a:t>
+              <a:t>8/26/2012</a:t>
             </a:fld>
             <a:endParaRPr lang="en-US"/>
           </a:p>
@@ -2332,7 +2332,7 @@
           <a:p>
             <a:fld id="{6E135D10-B346-49A2-97ED-CB96BA7E5DA0}" type="datetimeFigureOut">
               <a:rPr lang="en-US" smtClean="0"/>
-              <a:t>8/25/2012</a:t>
+              <a:t>8/26/2012</a:t>
             </a:fld>
             <a:endParaRPr lang="en-US"/>
           </a:p>
@@ -2609,7 +2609,7 @@
           <a:p>
             <a:fld id="{6E135D10-B346-49A2-97ED-CB96BA7E5DA0}" type="datetimeFigureOut">
               <a:rPr lang="en-US" smtClean="0"/>
-              <a:t>8/25/2012</a:t>
+              <a:t>8/26/2012</a:t>
             </a:fld>
             <a:endParaRPr lang="en-US"/>
           </a:p>
@@ -2862,7 +2862,7 @@
           <a:p>
             <a:fld id="{6E135D10-B346-49A2-97ED-CB96BA7E5DA0}" type="datetimeFigureOut">
               <a:rPr lang="en-US" smtClean="0"/>
-              <a:t>8/25/2012</a:t>
+              <a:t>8/26/2012</a:t>
             </a:fld>
             <a:endParaRPr lang="en-US"/>
           </a:p>
@@ -3075,7 +3075,7 @@
           <a:p>
             <a:fld id="{6E135D10-B346-49A2-97ED-CB96BA7E5DA0}" type="datetimeFigureOut">
               <a:rPr lang="en-US" smtClean="0"/>
-              <a:t>8/25/2012</a:t>
+              <a:t>8/26/2012</a:t>
             </a:fld>
             <a:endParaRPr lang="en-US"/>
           </a:p>
@@ -3513,19 +3513,7 @@
             </a:r>
             <a:r>
               <a:rPr lang="en-US" sz="1600" dirty="0" smtClean="0"/>
-              <a:t>) on Ubuntu 12.04. Boot off it, on your machine, or </a:t>
-            </a:r>
-            <a:r>
-              <a:rPr lang="en-US" sz="1600" dirty="0" smtClean="0"/>
-              <a:t>using</a:t>
-            </a:r>
-            <a:r>
-              <a:rPr lang="en-US" sz="1600" dirty="0" smtClean="0"/>
-              <a:t> </a:t>
-            </a:r>
-            <a:r>
-              <a:rPr lang="en-US" sz="1600" dirty="0" smtClean="0"/>
-              <a:t>virtualbox.org. </a:t>
+              <a:t>) on Ubuntu 12.04. Boot off it, on your machine, or using virtualbox.org. </a:t>
             </a:r>
             <a:r>
               <a:rPr lang="en-US" sz="1600" dirty="0" err="1"/>
@@ -3547,7 +3535,6 @@
               <a:rPr lang="en-US" sz="1600" dirty="0" smtClean="0"/>
               <a:t>.</a:t>
             </a:r>
-            <a:endParaRPr lang="en-US" sz="1600" dirty="0" smtClean="0"/>
           </a:p>
           <a:p>
             <a:r>
@@ -3917,7 +3904,31 @@
             <a:pPr lvl="1"/>
             <a:r>
               <a:rPr lang="en-US" sz="1600" dirty="0" smtClean="0"/>
-              <a:t>You can see/edit properties of any object in the right ‘Properties’ panel by single-click on a Molecule Pool (rectangle); or double-click on a Reaction (ellipse).</a:t>
+              <a:t>You can see/edit properties of any object in the right ‘Properties’ panel by </a:t>
+            </a:r>
+            <a:r>
+              <a:rPr lang="en-US" sz="1600" dirty="0" smtClean="0"/>
+              <a:t>double-clicking </a:t>
+            </a:r>
+            <a:r>
+              <a:rPr lang="en-US" sz="1600" dirty="0" smtClean="0"/>
+              <a:t>on a Molecule Pool (rectangle); or </a:t>
+            </a:r>
+            <a:r>
+              <a:rPr lang="en-US" sz="1600" dirty="0"/>
+              <a:t> </a:t>
+            </a:r>
+            <a:r>
+              <a:rPr lang="en-US" sz="1600" dirty="0" smtClean="0"/>
+              <a:t>a</a:t>
+            </a:r>
+            <a:r>
+              <a:rPr lang="en-US" sz="1600" dirty="0" smtClean="0"/>
+              <a:t> </a:t>
+            </a:r>
+            <a:r>
+              <a:rPr lang="en-US" sz="1600" dirty="0" smtClean="0"/>
+              <a:t>Reaction (ellipse).</a:t>
             </a:r>
           </a:p>
           <a:p>
@@ -4197,7 +4208,27 @@
             </a:r>
             <a:r>
               <a:rPr lang="en-US" sz="1600" dirty="0" smtClean="0"/>
-              <a:t> Layout’ tab, select an object by single-click on a Molecule Pool (rectangle); or double-click on a Reaction (ellipse).</a:t>
+              <a:t> Layout’ tab, select an object by </a:t>
+            </a:r>
+            <a:r>
+              <a:rPr lang="en-US" sz="1600" dirty="0" smtClean="0"/>
+              <a:t>double</a:t>
+            </a:r>
+            <a:r>
+              <a:rPr lang="en-US" sz="1600" dirty="0" smtClean="0"/>
+              <a:t>-clicking </a:t>
+            </a:r>
+            <a:r>
+              <a:rPr lang="en-US" sz="1600" dirty="0" smtClean="0"/>
+              <a:t>on a Molecule Pool (rectangle); </a:t>
+            </a:r>
+            <a:r>
+              <a:rPr lang="en-US" sz="1600" dirty="0" smtClean="0"/>
+              <a:t>or on </a:t>
+            </a:r>
+            <a:r>
+              <a:rPr lang="en-US" sz="1600" dirty="0" smtClean="0"/>
+              <a:t>a Reaction (ellipse).</a:t>
             </a:r>
           </a:p>
           <a:p>
@@ -4289,16 +4320,28 @@
             <a:pPr lvl="1"/>
             <a:r>
               <a:rPr lang="en-US" sz="1600" dirty="0" smtClean="0"/>
-              <a:t>Hodgkin-Huxley Squid demo; neuron </a:t>
+              <a:t>Hodgkin-Huxley Squid </a:t>
+            </a:r>
+            <a:r>
+              <a:rPr lang="en-US" sz="1600" dirty="0" smtClean="0"/>
+              <a:t>demo: desktop icon</a:t>
+            </a:r>
+          </a:p>
+          <a:p>
+            <a:pPr lvl="1"/>
+            <a:r>
+              <a:rPr lang="en-US" sz="1600" dirty="0" smtClean="0"/>
+              <a:t>CA1 / Granule cell in Demos/</a:t>
             </a:r>
             <a:r>
               <a:rPr lang="en-US" sz="1600" dirty="0" err="1" smtClean="0"/>
-              <a:t>sims</a:t>
+              <a:t>neuroml</a:t>
             </a:r>
             <a:r>
               <a:rPr lang="en-US" sz="1600" dirty="0" smtClean="0"/>
               <a:t>.</a:t>
             </a:r>
+            <a:endParaRPr lang="en-US" sz="1600" dirty="0" smtClean="0"/>
           </a:p>
           <a:p>
             <a:pPr lvl="1"/>

</xml_diff>